<commit_message>
Added some extra mvvm info
</commit_message>
<xml_diff>
--- a/doc/Presentation.pptx
+++ b/doc/Presentation.pptx
@@ -7880,6 +7880,13 @@
   <p:clrMapOvr>
     <a:masterClrMapping/>
   </p:clrMapOvr>
+  <p:timing>
+    <p:tnLst>
+      <p:par>
+        <p:cTn id="1" dur="indefinite" restart="never" nodeType="tmRoot"/>
+      </p:par>
+    </p:tnLst>
+  </p:timing>
 </p:sld>
 </file>
 
@@ -9189,6 +9196,173 @@
           </a:p>
         </p:txBody>
       </p:sp>
+      <p:sp>
+        <p:nvSpPr>
+          <p:cNvPr id="26" name="Rechthoek 25"/>
+          <p:cNvSpPr/>
+          <p:nvPr/>
+        </p:nvSpPr>
+        <p:spPr>
+          <a:xfrm>
+            <a:off x="-252536" y="-171400"/>
+            <a:ext cx="9721080" cy="7200800"/>
+          </a:xfrm>
+          <a:prstGeom prst="rect">
+            <a:avLst/>
+          </a:prstGeom>
+          <a:solidFill>
+            <a:schemeClr val="accent1">
+              <a:lumMod val="20000"/>
+              <a:lumOff val="80000"/>
+              <a:alpha val="69804"/>
+            </a:schemeClr>
+          </a:solidFill>
+        </p:spPr>
+        <p:style>
+          <a:lnRef idx="2">
+            <a:schemeClr val="accent1">
+              <a:shade val="50000"/>
+            </a:schemeClr>
+          </a:lnRef>
+          <a:fillRef idx="1">
+            <a:schemeClr val="accent1"/>
+          </a:fillRef>
+          <a:effectRef idx="0">
+            <a:schemeClr val="accent1"/>
+          </a:effectRef>
+          <a:fontRef idx="minor">
+            <a:schemeClr val="lt1"/>
+          </a:fontRef>
+        </p:style>
+        <p:txBody>
+          <a:bodyPr rtlCol="0" anchor="ctr"/>
+          <a:lstStyle/>
+          <a:p>
+            <a:pPr algn="ctr"/>
+            <a:endParaRPr lang="nl-NL"/>
+          </a:p>
+        </p:txBody>
+      </p:sp>
+      <p:sp>
+        <p:nvSpPr>
+          <p:cNvPr id="27" name="Tekstvak 26"/>
+          <p:cNvSpPr txBox="1"/>
+          <p:nvPr/>
+        </p:nvSpPr>
+        <p:spPr>
+          <a:xfrm>
+            <a:off x="395536" y="3429000"/>
+            <a:ext cx="1141659" cy="369332"/>
+          </a:xfrm>
+          <a:prstGeom prst="rect">
+            <a:avLst/>
+          </a:prstGeom>
+          <a:noFill/>
+        </p:spPr>
+        <p:txBody>
+          <a:bodyPr wrap="none" rtlCol="0">
+            <a:spAutoFit/>
+          </a:bodyPr>
+          <a:lstStyle/>
+          <a:p>
+            <a:r>
+              <a:rPr lang="nl-NL" dirty="0" err="1" smtClean="0"/>
+              <a:t>Visibility</a:t>
+            </a:r>
+            <a:endParaRPr lang="nl-NL" dirty="0"/>
+          </a:p>
+        </p:txBody>
+      </p:sp>
+      <p:sp>
+        <p:nvSpPr>
+          <p:cNvPr id="28" name="Tekstvak 27"/>
+          <p:cNvSpPr txBox="1"/>
+          <p:nvPr/>
+        </p:nvSpPr>
+        <p:spPr>
+          <a:xfrm>
+            <a:off x="1979712" y="3501008"/>
+            <a:ext cx="1075936" cy="369332"/>
+          </a:xfrm>
+          <a:prstGeom prst="rect">
+            <a:avLst/>
+          </a:prstGeom>
+          <a:noFill/>
+        </p:spPr>
+        <p:txBody>
+          <a:bodyPr wrap="none" rtlCol="0">
+            <a:spAutoFit/>
+          </a:bodyPr>
+          <a:lstStyle/>
+          <a:p>
+            <a:r>
+              <a:rPr lang="nl-NL" dirty="0" err="1" smtClean="0"/>
+              <a:t>Position</a:t>
+            </a:r>
+            <a:endParaRPr lang="nl-NL" dirty="0"/>
+          </a:p>
+        </p:txBody>
+      </p:sp>
+      <p:sp>
+        <p:nvSpPr>
+          <p:cNvPr id="29" name="Tekstvak 28"/>
+          <p:cNvSpPr txBox="1"/>
+          <p:nvPr/>
+        </p:nvSpPr>
+        <p:spPr>
+          <a:xfrm>
+            <a:off x="683568" y="4077072"/>
+            <a:ext cx="700833" cy="369332"/>
+          </a:xfrm>
+          <a:prstGeom prst="rect">
+            <a:avLst/>
+          </a:prstGeom>
+          <a:noFill/>
+        </p:spPr>
+        <p:txBody>
+          <a:bodyPr wrap="none" rtlCol="0">
+            <a:spAutoFit/>
+          </a:bodyPr>
+          <a:lstStyle/>
+          <a:p>
+            <a:r>
+              <a:rPr lang="nl-NL" dirty="0" smtClean="0"/>
+              <a:t>Data</a:t>
+            </a:r>
+            <a:endParaRPr lang="nl-NL" dirty="0"/>
+          </a:p>
+        </p:txBody>
+      </p:sp>
+      <p:sp>
+        <p:nvSpPr>
+          <p:cNvPr id="30" name="Tekstvak 29"/>
+          <p:cNvSpPr txBox="1"/>
+          <p:nvPr/>
+        </p:nvSpPr>
+        <p:spPr>
+          <a:xfrm>
+            <a:off x="1619672" y="3861048"/>
+            <a:ext cx="2031325" cy="369332"/>
+          </a:xfrm>
+          <a:prstGeom prst="rect">
+            <a:avLst/>
+          </a:prstGeom>
+          <a:noFill/>
+        </p:spPr>
+        <p:txBody>
+          <a:bodyPr wrap="none" rtlCol="0">
+            <a:spAutoFit/>
+          </a:bodyPr>
+          <a:lstStyle/>
+          <a:p>
+            <a:r>
+              <a:rPr lang="nl-NL" dirty="0" err="1" smtClean="0"/>
+              <a:t>Transformations</a:t>
+            </a:r>
+            <a:endParaRPr lang="nl-NL" dirty="0"/>
+          </a:p>
+        </p:txBody>
+      </p:sp>
     </p:spTree>
     <p:extLst>
       <p:ext uri="{BB962C8B-B14F-4D97-AF65-F5344CB8AC3E}">
@@ -9330,6 +9504,423 @@
                       </p:childTnLst>
                     </p:cTn>
                   </p:par>
+                  <p:par>
+                    <p:cTn id="14" fill="hold">
+                      <p:stCondLst>
+                        <p:cond delay="indefinite"/>
+                      </p:stCondLst>
+                      <p:childTnLst>
+                        <p:par>
+                          <p:cTn id="15" fill="hold">
+                            <p:stCondLst>
+                              <p:cond delay="0"/>
+                            </p:stCondLst>
+                            <p:childTnLst>
+                              <p:par>
+                                <p:cTn id="16" presetID="3" presetClass="entr" presetSubtype="10" fill="hold" grpId="0" nodeType="clickEffect">
+                                  <p:stCondLst>
+                                    <p:cond delay="0"/>
+                                  </p:stCondLst>
+                                  <p:childTnLst>
+                                    <p:set>
+                                      <p:cBhvr>
+                                        <p:cTn id="17" dur="1" fill="hold">
+                                          <p:stCondLst>
+                                            <p:cond delay="0"/>
+                                          </p:stCondLst>
+                                        </p:cTn>
+                                        <p:tgtEl>
+                                          <p:spTgt spid="26"/>
+                                        </p:tgtEl>
+                                        <p:attrNameLst>
+                                          <p:attrName>style.visibility</p:attrName>
+                                        </p:attrNameLst>
+                                      </p:cBhvr>
+                                      <p:to>
+                                        <p:strVal val="visible"/>
+                                      </p:to>
+                                    </p:set>
+                                    <p:animEffect transition="in" filter="blinds(horizontal)">
+                                      <p:cBhvr>
+                                        <p:cTn id="18" dur="500"/>
+                                        <p:tgtEl>
+                                          <p:spTgt spid="26"/>
+                                        </p:tgtEl>
+                                      </p:cBhvr>
+                                    </p:animEffect>
+                                  </p:childTnLst>
+                                </p:cTn>
+                              </p:par>
+                            </p:childTnLst>
+                          </p:cTn>
+                        </p:par>
+                      </p:childTnLst>
+                    </p:cTn>
+                  </p:par>
+                  <p:par>
+                    <p:cTn id="19" fill="hold">
+                      <p:stCondLst>
+                        <p:cond delay="indefinite"/>
+                      </p:stCondLst>
+                      <p:childTnLst>
+                        <p:par>
+                          <p:cTn id="20" fill="hold">
+                            <p:stCondLst>
+                              <p:cond delay="0"/>
+                            </p:stCondLst>
+                            <p:childTnLst>
+                              <p:par>
+                                <p:cTn id="21" presetID="2" presetClass="entr" presetSubtype="4" fill="hold" grpId="0" nodeType="clickEffect">
+                                  <p:stCondLst>
+                                    <p:cond delay="0"/>
+                                  </p:stCondLst>
+                                  <p:childTnLst>
+                                    <p:set>
+                                      <p:cBhvr>
+                                        <p:cTn id="22" dur="1" fill="hold">
+                                          <p:stCondLst>
+                                            <p:cond delay="0"/>
+                                          </p:stCondLst>
+                                        </p:cTn>
+                                        <p:tgtEl>
+                                          <p:spTgt spid="29"/>
+                                        </p:tgtEl>
+                                        <p:attrNameLst>
+                                          <p:attrName>style.visibility</p:attrName>
+                                        </p:attrNameLst>
+                                      </p:cBhvr>
+                                      <p:to>
+                                        <p:strVal val="visible"/>
+                                      </p:to>
+                                    </p:set>
+                                    <p:anim calcmode="lin" valueType="num">
+                                      <p:cBhvr additive="base">
+                                        <p:cTn id="23" dur="500" fill="hold"/>
+                                        <p:tgtEl>
+                                          <p:spTgt spid="29"/>
+                                        </p:tgtEl>
+                                        <p:attrNameLst>
+                                          <p:attrName>ppt_x</p:attrName>
+                                        </p:attrNameLst>
+                                      </p:cBhvr>
+                                      <p:tavLst>
+                                        <p:tav tm="0">
+                                          <p:val>
+                                            <p:strVal val="#ppt_x"/>
+                                          </p:val>
+                                        </p:tav>
+                                        <p:tav tm="100000">
+                                          <p:val>
+                                            <p:strVal val="#ppt_x"/>
+                                          </p:val>
+                                        </p:tav>
+                                      </p:tavLst>
+                                    </p:anim>
+                                    <p:anim calcmode="lin" valueType="num">
+                                      <p:cBhvr additive="base">
+                                        <p:cTn id="24" dur="500" fill="hold"/>
+                                        <p:tgtEl>
+                                          <p:spTgt spid="29"/>
+                                        </p:tgtEl>
+                                        <p:attrNameLst>
+                                          <p:attrName>ppt_y</p:attrName>
+                                        </p:attrNameLst>
+                                      </p:cBhvr>
+                                      <p:tavLst>
+                                        <p:tav tm="0">
+                                          <p:val>
+                                            <p:strVal val="1+#ppt_h/2"/>
+                                          </p:val>
+                                        </p:tav>
+                                        <p:tav tm="100000">
+                                          <p:val>
+                                            <p:strVal val="#ppt_y"/>
+                                          </p:val>
+                                        </p:tav>
+                                      </p:tavLst>
+                                    </p:anim>
+                                  </p:childTnLst>
+                                </p:cTn>
+                              </p:par>
+                            </p:childTnLst>
+                          </p:cTn>
+                        </p:par>
+                      </p:childTnLst>
+                    </p:cTn>
+                  </p:par>
+                  <p:par>
+                    <p:cTn id="25" fill="hold">
+                      <p:stCondLst>
+                        <p:cond delay="indefinite"/>
+                      </p:stCondLst>
+                      <p:childTnLst>
+                        <p:par>
+                          <p:cTn id="26" fill="hold">
+                            <p:stCondLst>
+                              <p:cond delay="0"/>
+                            </p:stCondLst>
+                            <p:childTnLst>
+                              <p:par>
+                                <p:cTn id="27" presetID="2" presetClass="entr" presetSubtype="4" fill="hold" grpId="0" nodeType="clickEffect">
+                                  <p:stCondLst>
+                                    <p:cond delay="0"/>
+                                  </p:stCondLst>
+                                  <p:childTnLst>
+                                    <p:set>
+                                      <p:cBhvr>
+                                        <p:cTn id="28" dur="1" fill="hold">
+                                          <p:stCondLst>
+                                            <p:cond delay="0"/>
+                                          </p:stCondLst>
+                                        </p:cTn>
+                                        <p:tgtEl>
+                                          <p:spTgt spid="27"/>
+                                        </p:tgtEl>
+                                        <p:attrNameLst>
+                                          <p:attrName>style.visibility</p:attrName>
+                                        </p:attrNameLst>
+                                      </p:cBhvr>
+                                      <p:to>
+                                        <p:strVal val="visible"/>
+                                      </p:to>
+                                    </p:set>
+                                    <p:anim calcmode="lin" valueType="num">
+                                      <p:cBhvr additive="base">
+                                        <p:cTn id="29" dur="500" fill="hold"/>
+                                        <p:tgtEl>
+                                          <p:spTgt spid="27"/>
+                                        </p:tgtEl>
+                                        <p:attrNameLst>
+                                          <p:attrName>ppt_x</p:attrName>
+                                        </p:attrNameLst>
+                                      </p:cBhvr>
+                                      <p:tavLst>
+                                        <p:tav tm="0">
+                                          <p:val>
+                                            <p:strVal val="#ppt_x"/>
+                                          </p:val>
+                                        </p:tav>
+                                        <p:tav tm="100000">
+                                          <p:val>
+                                            <p:strVal val="#ppt_x"/>
+                                          </p:val>
+                                        </p:tav>
+                                      </p:tavLst>
+                                    </p:anim>
+                                    <p:anim calcmode="lin" valueType="num">
+                                      <p:cBhvr additive="base">
+                                        <p:cTn id="30" dur="500" fill="hold"/>
+                                        <p:tgtEl>
+                                          <p:spTgt spid="27"/>
+                                        </p:tgtEl>
+                                        <p:attrNameLst>
+                                          <p:attrName>ppt_y</p:attrName>
+                                        </p:attrNameLst>
+                                      </p:cBhvr>
+                                      <p:tavLst>
+                                        <p:tav tm="0">
+                                          <p:val>
+                                            <p:strVal val="1+#ppt_h/2"/>
+                                          </p:val>
+                                        </p:tav>
+                                        <p:tav tm="100000">
+                                          <p:val>
+                                            <p:strVal val="#ppt_y"/>
+                                          </p:val>
+                                        </p:tav>
+                                      </p:tavLst>
+                                    </p:anim>
+                                  </p:childTnLst>
+                                </p:cTn>
+                              </p:par>
+                            </p:childTnLst>
+                          </p:cTn>
+                        </p:par>
+                      </p:childTnLst>
+                    </p:cTn>
+                  </p:par>
+                  <p:par>
+                    <p:cTn id="31" fill="hold">
+                      <p:stCondLst>
+                        <p:cond delay="indefinite"/>
+                      </p:stCondLst>
+                      <p:childTnLst>
+                        <p:par>
+                          <p:cTn id="32" fill="hold">
+                            <p:stCondLst>
+                              <p:cond delay="0"/>
+                            </p:stCondLst>
+                            <p:childTnLst>
+                              <p:par>
+                                <p:cTn id="33" presetID="2" presetClass="entr" presetSubtype="4" fill="hold" grpId="0" nodeType="clickEffect">
+                                  <p:stCondLst>
+                                    <p:cond delay="0"/>
+                                  </p:stCondLst>
+                                  <p:childTnLst>
+                                    <p:set>
+                                      <p:cBhvr>
+                                        <p:cTn id="34" dur="1" fill="hold">
+                                          <p:stCondLst>
+                                            <p:cond delay="0"/>
+                                          </p:stCondLst>
+                                        </p:cTn>
+                                        <p:tgtEl>
+                                          <p:spTgt spid="28"/>
+                                        </p:tgtEl>
+                                        <p:attrNameLst>
+                                          <p:attrName>style.visibility</p:attrName>
+                                        </p:attrNameLst>
+                                      </p:cBhvr>
+                                      <p:to>
+                                        <p:strVal val="visible"/>
+                                      </p:to>
+                                    </p:set>
+                                    <p:anim calcmode="lin" valueType="num">
+                                      <p:cBhvr additive="base">
+                                        <p:cTn id="35" dur="500" fill="hold"/>
+                                        <p:tgtEl>
+                                          <p:spTgt spid="28"/>
+                                        </p:tgtEl>
+                                        <p:attrNameLst>
+                                          <p:attrName>ppt_x</p:attrName>
+                                        </p:attrNameLst>
+                                      </p:cBhvr>
+                                      <p:tavLst>
+                                        <p:tav tm="0">
+                                          <p:val>
+                                            <p:strVal val="#ppt_x"/>
+                                          </p:val>
+                                        </p:tav>
+                                        <p:tav tm="100000">
+                                          <p:val>
+                                            <p:strVal val="#ppt_x"/>
+                                          </p:val>
+                                        </p:tav>
+                                      </p:tavLst>
+                                    </p:anim>
+                                    <p:anim calcmode="lin" valueType="num">
+                                      <p:cBhvr additive="base">
+                                        <p:cTn id="36" dur="500" fill="hold"/>
+                                        <p:tgtEl>
+                                          <p:spTgt spid="28"/>
+                                        </p:tgtEl>
+                                        <p:attrNameLst>
+                                          <p:attrName>ppt_y</p:attrName>
+                                        </p:attrNameLst>
+                                      </p:cBhvr>
+                                      <p:tavLst>
+                                        <p:tav tm="0">
+                                          <p:val>
+                                            <p:strVal val="1+#ppt_h/2"/>
+                                          </p:val>
+                                        </p:tav>
+                                        <p:tav tm="100000">
+                                          <p:val>
+                                            <p:strVal val="#ppt_y"/>
+                                          </p:val>
+                                        </p:tav>
+                                      </p:tavLst>
+                                    </p:anim>
+                                  </p:childTnLst>
+                                </p:cTn>
+                              </p:par>
+                            </p:childTnLst>
+                          </p:cTn>
+                        </p:par>
+                      </p:childTnLst>
+                    </p:cTn>
+                  </p:par>
+                  <p:par>
+                    <p:cTn id="37" fill="hold">
+                      <p:stCondLst>
+                        <p:cond delay="indefinite"/>
+                      </p:stCondLst>
+                      <p:childTnLst>
+                        <p:par>
+                          <p:cTn id="38" fill="hold">
+                            <p:stCondLst>
+                              <p:cond delay="0"/>
+                            </p:stCondLst>
+                            <p:childTnLst>
+                              <p:par>
+                                <p:cTn id="39" presetID="2" presetClass="entr" presetSubtype="4" fill="hold" grpId="0" nodeType="clickEffect">
+                                  <p:stCondLst>
+                                    <p:cond delay="0"/>
+                                  </p:stCondLst>
+                                  <p:childTnLst>
+                                    <p:set>
+                                      <p:cBhvr>
+                                        <p:cTn id="40" dur="1" fill="hold">
+                                          <p:stCondLst>
+                                            <p:cond delay="0"/>
+                                          </p:stCondLst>
+                                        </p:cTn>
+                                        <p:tgtEl>
+                                          <p:spTgt spid="30"/>
+                                        </p:tgtEl>
+                                        <p:attrNameLst>
+                                          <p:attrName>style.visibility</p:attrName>
+                                        </p:attrNameLst>
+                                      </p:cBhvr>
+                                      <p:to>
+                                        <p:strVal val="visible"/>
+                                      </p:to>
+                                    </p:set>
+                                    <p:anim calcmode="lin" valueType="num">
+                                      <p:cBhvr additive="base">
+                                        <p:cTn id="41" dur="500" fill="hold"/>
+                                        <p:tgtEl>
+                                          <p:spTgt spid="30"/>
+                                        </p:tgtEl>
+                                        <p:attrNameLst>
+                                          <p:attrName>ppt_x</p:attrName>
+                                        </p:attrNameLst>
+                                      </p:cBhvr>
+                                      <p:tavLst>
+                                        <p:tav tm="0">
+                                          <p:val>
+                                            <p:strVal val="#ppt_x"/>
+                                          </p:val>
+                                        </p:tav>
+                                        <p:tav tm="100000">
+                                          <p:val>
+                                            <p:strVal val="#ppt_x"/>
+                                          </p:val>
+                                        </p:tav>
+                                      </p:tavLst>
+                                    </p:anim>
+                                    <p:anim calcmode="lin" valueType="num">
+                                      <p:cBhvr additive="base">
+                                        <p:cTn id="42" dur="500" fill="hold"/>
+                                        <p:tgtEl>
+                                          <p:spTgt spid="30"/>
+                                        </p:tgtEl>
+                                        <p:attrNameLst>
+                                          <p:attrName>ppt_y</p:attrName>
+                                        </p:attrNameLst>
+                                      </p:cBhvr>
+                                      <p:tavLst>
+                                        <p:tav tm="0">
+                                          <p:val>
+                                            <p:strVal val="1+#ppt_h/2"/>
+                                          </p:val>
+                                        </p:tav>
+                                        <p:tav tm="100000">
+                                          <p:val>
+                                            <p:strVal val="#ppt_y"/>
+                                          </p:val>
+                                        </p:tav>
+                                      </p:tavLst>
+                                    </p:anim>
+                                  </p:childTnLst>
+                                </p:cTn>
+                              </p:par>
+                            </p:childTnLst>
+                          </p:cTn>
+                        </p:par>
+                      </p:childTnLst>
+                    </p:cTn>
+                  </p:par>
                 </p:childTnLst>
               </p:cTn>
               <p:prevCondLst>
@@ -9355,6 +9946,11 @@
       <p:bldP spid="12" grpId="0"/>
       <p:bldP spid="13" grpId="0"/>
       <p:bldP spid="21" grpId="0"/>
+      <p:bldP spid="26" grpId="0" animBg="1"/>
+      <p:bldP spid="27" grpId="0"/>
+      <p:bldP spid="28" grpId="0"/>
+      <p:bldP spid="29" grpId="0"/>
+      <p:bldP spid="30" grpId="0"/>
     </p:bldLst>
   </p:timing>
 </p:sld>
@@ -9510,6 +10106,13 @@
   <p:clrMapOvr>
     <a:masterClrMapping/>
   </p:clrMapOvr>
+  <p:timing>
+    <p:tnLst>
+      <p:par>
+        <p:cTn id="1" dur="indefinite" restart="never" nodeType="tmRoot"/>
+      </p:par>
+    </p:tnLst>
+  </p:timing>
 </p:sld>
 </file>
 
@@ -9644,6 +10247,13 @@
   <p:clrMapOvr>
     <a:masterClrMapping/>
   </p:clrMapOvr>
+  <p:timing>
+    <p:tnLst>
+      <p:par>
+        <p:cTn id="1" dur="indefinite" restart="never" nodeType="tmRoot"/>
+      </p:par>
+    </p:tnLst>
+  </p:timing>
 </p:sld>
 </file>
 

</xml_diff>